<commit_message>
end FULL sstem misaligned
</commit_message>
<xml_diff>
--- a/BS.pptx
+++ b/BS.pptx
@@ -299,7 +299,7 @@
           <a:p>
             <a:fld id="{F2853615-BFDE-46DE-814C-47EC6EF6D371}" type="datetimeFigureOut">
               <a:rPr lang="el-GR" smtClean="0"/>
-              <a:t>9/12/2022</a:t>
+              <a:t>13/12/2022</a:t>
             </a:fld>
             <a:endParaRPr lang="el-GR"/>
           </a:p>
@@ -464,7 +464,7 @@
           <a:p>
             <a:fld id="{F2853615-BFDE-46DE-814C-47EC6EF6D371}" type="datetimeFigureOut">
               <a:rPr lang="el-GR" smtClean="0"/>
-              <a:t>9/12/2022</a:t>
+              <a:t>13/12/2022</a:t>
             </a:fld>
             <a:endParaRPr lang="el-GR"/>
           </a:p>
@@ -639,7 +639,7 @@
           <a:p>
             <a:fld id="{F2853615-BFDE-46DE-814C-47EC6EF6D371}" type="datetimeFigureOut">
               <a:rPr lang="el-GR" smtClean="0"/>
-              <a:t>9/12/2022</a:t>
+              <a:t>13/12/2022</a:t>
             </a:fld>
             <a:endParaRPr lang="el-GR"/>
           </a:p>
@@ -804,7 +804,7 @@
           <a:p>
             <a:fld id="{F2853615-BFDE-46DE-814C-47EC6EF6D371}" type="datetimeFigureOut">
               <a:rPr lang="el-GR" smtClean="0"/>
-              <a:t>9/12/2022</a:t>
+              <a:t>13/12/2022</a:t>
             </a:fld>
             <a:endParaRPr lang="el-GR"/>
           </a:p>
@@ -1045,7 +1045,7 @@
           <a:p>
             <a:fld id="{F2853615-BFDE-46DE-814C-47EC6EF6D371}" type="datetimeFigureOut">
               <a:rPr lang="el-GR" smtClean="0"/>
-              <a:t>9/12/2022</a:t>
+              <a:t>13/12/2022</a:t>
             </a:fld>
             <a:endParaRPr lang="el-GR"/>
           </a:p>
@@ -1328,7 +1328,7 @@
           <a:p>
             <a:fld id="{F2853615-BFDE-46DE-814C-47EC6EF6D371}" type="datetimeFigureOut">
               <a:rPr lang="el-GR" smtClean="0"/>
-              <a:t>9/12/2022</a:t>
+              <a:t>13/12/2022</a:t>
             </a:fld>
             <a:endParaRPr lang="el-GR"/>
           </a:p>
@@ -1745,7 +1745,7 @@
           <a:p>
             <a:fld id="{F2853615-BFDE-46DE-814C-47EC6EF6D371}" type="datetimeFigureOut">
               <a:rPr lang="el-GR" smtClean="0"/>
-              <a:t>9/12/2022</a:t>
+              <a:t>13/12/2022</a:t>
             </a:fld>
             <a:endParaRPr lang="el-GR"/>
           </a:p>
@@ -1858,7 +1858,7 @@
           <a:p>
             <a:fld id="{F2853615-BFDE-46DE-814C-47EC6EF6D371}" type="datetimeFigureOut">
               <a:rPr lang="el-GR" smtClean="0"/>
-              <a:t>9/12/2022</a:t>
+              <a:t>13/12/2022</a:t>
             </a:fld>
             <a:endParaRPr lang="el-GR"/>
           </a:p>
@@ -1948,7 +1948,7 @@
           <a:p>
             <a:fld id="{F2853615-BFDE-46DE-814C-47EC6EF6D371}" type="datetimeFigureOut">
               <a:rPr lang="el-GR" smtClean="0"/>
-              <a:t>9/12/2022</a:t>
+              <a:t>13/12/2022</a:t>
             </a:fld>
             <a:endParaRPr lang="el-GR"/>
           </a:p>
@@ -2220,7 +2220,7 @@
           <a:p>
             <a:fld id="{F2853615-BFDE-46DE-814C-47EC6EF6D371}" type="datetimeFigureOut">
               <a:rPr lang="el-GR" smtClean="0"/>
-              <a:t>9/12/2022</a:t>
+              <a:t>13/12/2022</a:t>
             </a:fld>
             <a:endParaRPr lang="el-GR"/>
           </a:p>
@@ -2468,7 +2468,7 @@
           <a:p>
             <a:fld id="{F2853615-BFDE-46DE-814C-47EC6EF6D371}" type="datetimeFigureOut">
               <a:rPr lang="el-GR" smtClean="0"/>
-              <a:t>9/12/2022</a:t>
+              <a:t>13/12/2022</a:t>
             </a:fld>
             <a:endParaRPr lang="el-GR"/>
           </a:p>
@@ -2676,7 +2676,7 @@
           <a:p>
             <a:fld id="{F2853615-BFDE-46DE-814C-47EC6EF6D371}" type="datetimeFigureOut">
               <a:rPr lang="el-GR" smtClean="0"/>
-              <a:t>9/12/2022</a:t>
+              <a:t>13/12/2022</a:t>
             </a:fld>
             <a:endParaRPr lang="el-GR"/>
           </a:p>
@@ -3561,7 +3561,7 @@
       </p:sp>
       <p:pic>
         <p:nvPicPr>
-          <p:cNvPr id="1026" name="Picture 2" descr="C:\Users\Aggelos\Downloads\barrelShifter-Σελίδα-1.drawio (1).png"/>
+          <p:cNvPr id="3" name="Picture 2" descr="C:\Users\Aggelos\Downloads\barrelShifter-Σελίδα-1.drawio (3).png"/>
           <p:cNvPicPr>
             <a:picLocks noChangeAspect="1" noChangeArrowheads="1"/>
           </p:cNvPicPr>
@@ -3575,13 +3575,13 @@
               </a:ext>
             </a:extLst>
           </a:blip>
-          <a:srcRect t="6734" b="2373"/>
+          <a:srcRect t="5136"/>
           <a:stretch/>
         </p:blipFill>
         <p:spPr bwMode="auto">
           <a:xfrm>
-            <a:off x="179511" y="980728"/>
-            <a:ext cx="8640469" cy="5773446"/>
+            <a:off x="0" y="980728"/>
+            <a:ext cx="9144000" cy="5617675"/>
           </a:xfrm>
           <a:prstGeom prst="rect">
             <a:avLst/>

</xml_diff>

<commit_message>
end full system misaligned
</commit_message>
<xml_diff>
--- a/BS.pptx
+++ b/BS.pptx
@@ -6,17 +6,26 @@
   </p:sldMasterIdLst>
   <p:sldIdLst>
     <p:sldId id="256" r:id="rId2"/>
-    <p:sldId id="257" r:id="rId3"/>
-    <p:sldId id="258" r:id="rId4"/>
-    <p:sldId id="259" r:id="rId5"/>
-    <p:sldId id="260" r:id="rId6"/>
-    <p:sldId id="261" r:id="rId7"/>
-    <p:sldId id="262" r:id="rId8"/>
-    <p:sldId id="263" r:id="rId9"/>
-    <p:sldId id="264" r:id="rId10"/>
-    <p:sldId id="265" r:id="rId11"/>
-    <p:sldId id="266" r:id="rId12"/>
-    <p:sldId id="267" r:id="rId13"/>
+    <p:sldId id="269" r:id="rId3"/>
+    <p:sldId id="257" r:id="rId4"/>
+    <p:sldId id="258" r:id="rId5"/>
+    <p:sldId id="259" r:id="rId6"/>
+    <p:sldId id="260" r:id="rId7"/>
+    <p:sldId id="261" r:id="rId8"/>
+    <p:sldId id="262" r:id="rId9"/>
+    <p:sldId id="263" r:id="rId10"/>
+    <p:sldId id="264" r:id="rId11"/>
+    <p:sldId id="265" r:id="rId12"/>
+    <p:sldId id="266" r:id="rId13"/>
+    <p:sldId id="267" r:id="rId14"/>
+    <p:sldId id="268" r:id="rId15"/>
+    <p:sldId id="270" r:id="rId16"/>
+    <p:sldId id="271" r:id="rId17"/>
+    <p:sldId id="272" r:id="rId18"/>
+    <p:sldId id="273" r:id="rId19"/>
+    <p:sldId id="274" r:id="rId20"/>
+    <p:sldId id="275" r:id="rId21"/>
+    <p:sldId id="276" r:id="rId22"/>
   </p:sldIdLst>
   <p:sldSz cx="9144000" cy="6858000" type="screen4x3"/>
   <p:notesSz cx="6858000" cy="9144000"/>
@@ -299,7 +308,7 @@
           <a:p>
             <a:fld id="{F2853615-BFDE-46DE-814C-47EC6EF6D371}" type="datetimeFigureOut">
               <a:rPr lang="el-GR" smtClean="0"/>
-              <a:t>13/12/2022</a:t>
+              <a:t>20/12/2022</a:t>
             </a:fld>
             <a:endParaRPr lang="el-GR"/>
           </a:p>
@@ -464,7 +473,7 @@
           <a:p>
             <a:fld id="{F2853615-BFDE-46DE-814C-47EC6EF6D371}" type="datetimeFigureOut">
               <a:rPr lang="el-GR" smtClean="0"/>
-              <a:t>13/12/2022</a:t>
+              <a:t>20/12/2022</a:t>
             </a:fld>
             <a:endParaRPr lang="el-GR"/>
           </a:p>
@@ -639,7 +648,7 @@
           <a:p>
             <a:fld id="{F2853615-BFDE-46DE-814C-47EC6EF6D371}" type="datetimeFigureOut">
               <a:rPr lang="el-GR" smtClean="0"/>
-              <a:t>13/12/2022</a:t>
+              <a:t>20/12/2022</a:t>
             </a:fld>
             <a:endParaRPr lang="el-GR"/>
           </a:p>
@@ -804,7 +813,7 @@
           <a:p>
             <a:fld id="{F2853615-BFDE-46DE-814C-47EC6EF6D371}" type="datetimeFigureOut">
               <a:rPr lang="el-GR" smtClean="0"/>
-              <a:t>13/12/2022</a:t>
+              <a:t>20/12/2022</a:t>
             </a:fld>
             <a:endParaRPr lang="el-GR"/>
           </a:p>
@@ -1045,7 +1054,7 @@
           <a:p>
             <a:fld id="{F2853615-BFDE-46DE-814C-47EC6EF6D371}" type="datetimeFigureOut">
               <a:rPr lang="el-GR" smtClean="0"/>
-              <a:t>13/12/2022</a:t>
+              <a:t>20/12/2022</a:t>
             </a:fld>
             <a:endParaRPr lang="el-GR"/>
           </a:p>
@@ -1328,7 +1337,7 @@
           <a:p>
             <a:fld id="{F2853615-BFDE-46DE-814C-47EC6EF6D371}" type="datetimeFigureOut">
               <a:rPr lang="el-GR" smtClean="0"/>
-              <a:t>13/12/2022</a:t>
+              <a:t>20/12/2022</a:t>
             </a:fld>
             <a:endParaRPr lang="el-GR"/>
           </a:p>
@@ -1745,7 +1754,7 @@
           <a:p>
             <a:fld id="{F2853615-BFDE-46DE-814C-47EC6EF6D371}" type="datetimeFigureOut">
               <a:rPr lang="el-GR" smtClean="0"/>
-              <a:t>13/12/2022</a:t>
+              <a:t>20/12/2022</a:t>
             </a:fld>
             <a:endParaRPr lang="el-GR"/>
           </a:p>
@@ -1858,7 +1867,7 @@
           <a:p>
             <a:fld id="{F2853615-BFDE-46DE-814C-47EC6EF6D371}" type="datetimeFigureOut">
               <a:rPr lang="el-GR" smtClean="0"/>
-              <a:t>13/12/2022</a:t>
+              <a:t>20/12/2022</a:t>
             </a:fld>
             <a:endParaRPr lang="el-GR"/>
           </a:p>
@@ -1948,7 +1957,7 @@
           <a:p>
             <a:fld id="{F2853615-BFDE-46DE-814C-47EC6EF6D371}" type="datetimeFigureOut">
               <a:rPr lang="el-GR" smtClean="0"/>
-              <a:t>13/12/2022</a:t>
+              <a:t>20/12/2022</a:t>
             </a:fld>
             <a:endParaRPr lang="el-GR"/>
           </a:p>
@@ -2220,7 +2229,7 @@
           <a:p>
             <a:fld id="{F2853615-BFDE-46DE-814C-47EC6EF6D371}" type="datetimeFigureOut">
               <a:rPr lang="el-GR" smtClean="0"/>
-              <a:t>13/12/2022</a:t>
+              <a:t>20/12/2022</a:t>
             </a:fld>
             <a:endParaRPr lang="el-GR"/>
           </a:p>
@@ -2468,7 +2477,7 @@
           <a:p>
             <a:fld id="{F2853615-BFDE-46DE-814C-47EC6EF6D371}" type="datetimeFigureOut">
               <a:rPr lang="el-GR" smtClean="0"/>
-              <a:t>13/12/2022</a:t>
+              <a:t>20/12/2022</a:t>
             </a:fld>
             <a:endParaRPr lang="el-GR"/>
           </a:p>
@@ -2676,7 +2685,7 @@
           <a:p>
             <a:fld id="{F2853615-BFDE-46DE-814C-47EC6EF6D371}" type="datetimeFigureOut">
               <a:rPr lang="el-GR" smtClean="0"/>
-              <a:t>13/12/2022</a:t>
+              <a:t>20/12/2022</a:t>
             </a:fld>
             <a:endParaRPr lang="el-GR"/>
           </a:p>
@@ -3135,6 +3144,148 @@
           <a:p>
             <a:r>
               <a:rPr lang="en-US" dirty="0" smtClean="0"/>
+              <a:t>Case 4</a:t>
+            </a:r>
+            <a:endParaRPr lang="el-GR" dirty="0"/>
+          </a:p>
+        </p:txBody>
+      </p:sp>
+      <p:pic>
+        <p:nvPicPr>
+          <p:cNvPr id="7170" name="Picture 2" descr="C:\Users\Aggelos\Downloads\barrelShifter-Σελίδα-7.drawio (3).png"/>
+          <p:cNvPicPr>
+            <a:picLocks noChangeAspect="1" noChangeArrowheads="1"/>
+          </p:cNvPicPr>
+          <p:nvPr/>
+        </p:nvPicPr>
+        <p:blipFill>
+          <a:blip r:embed="rId2">
+            <a:extLst>
+              <a:ext uri="{28A0092B-C50C-407E-A947-70E740481C1C}">
+                <a14:useLocalDpi xmlns:a14="http://schemas.microsoft.com/office/drawing/2010/main" val="0"/>
+              </a:ext>
+            </a:extLst>
+          </a:blip>
+          <a:srcRect/>
+          <a:stretch>
+            <a:fillRect/>
+          </a:stretch>
+        </p:blipFill>
+        <p:spPr bwMode="auto">
+          <a:xfrm>
+            <a:off x="1331640" y="1324412"/>
+            <a:ext cx="5400600" cy="5400600"/>
+          </a:xfrm>
+          <a:prstGeom prst="rect">
+            <a:avLst/>
+          </a:prstGeom>
+          <a:noFill/>
+          <a:extLst>
+            <a:ext uri="{909E8E84-426E-40DD-AFC4-6F175D3DCCD1}">
+              <a14:hiddenFill xmlns:a14="http://schemas.microsoft.com/office/drawing/2010/main">
+                <a:solidFill>
+                  <a:srgbClr val="FFFFFF"/>
+                </a:solidFill>
+              </a14:hiddenFill>
+            </a:ext>
+          </a:extLst>
+        </p:spPr>
+      </p:pic>
+      <p:sp>
+        <p:nvSpPr>
+          <p:cNvPr id="7" name="Ορθογώνιο 6"/>
+          <p:cNvSpPr/>
+          <p:nvPr/>
+        </p:nvSpPr>
+        <p:spPr>
+          <a:xfrm>
+            <a:off x="539553" y="1916832"/>
+            <a:ext cx="3096344" cy="646331"/>
+          </a:xfrm>
+          <a:prstGeom prst="rect">
+            <a:avLst/>
+          </a:prstGeom>
+        </p:spPr>
+        <p:txBody>
+          <a:bodyPr wrap="square">
+            <a:spAutoFit/>
+          </a:bodyPr>
+          <a:lstStyle/>
+          <a:p>
+            <a:r>
+              <a:rPr lang="en-US" dirty="0"/>
+              <a:t>Shift left </a:t>
+            </a:r>
+            <a:endParaRPr lang="en-US" dirty="0" smtClean="0"/>
+          </a:p>
+          <a:p>
+            <a:r>
+              <a:rPr lang="en-US" dirty="0" err="1" smtClean="0"/>
+              <a:t>NumbOfRead</a:t>
+            </a:r>
+            <a:r>
+              <a:rPr lang="en-US" dirty="0" smtClean="0"/>
+              <a:t> != </a:t>
+            </a:r>
+            <a:r>
+              <a:rPr lang="en-US" dirty="0" err="1"/>
+              <a:t>NumOfWrite</a:t>
+            </a:r>
+            <a:r>
+              <a:rPr lang="en-US" dirty="0"/>
+              <a:t> </a:t>
+            </a:r>
+            <a:endParaRPr lang="el-GR" dirty="0"/>
+          </a:p>
+        </p:txBody>
+      </p:sp>
+    </p:spTree>
+    <p:extLst>
+      <p:ext uri="{BB962C8B-B14F-4D97-AF65-F5344CB8AC3E}">
+        <p14:creationId xmlns:p14="http://schemas.microsoft.com/office/powerpoint/2010/main" val="2626354569"/>
+      </p:ext>
+    </p:extLst>
+  </p:cSld>
+  <p:clrMapOvr>
+    <a:masterClrMapping/>
+  </p:clrMapOvr>
+</p:sld>
+</file>
+
+<file path=ppt/slides/slide11.xml><?xml version="1.0" encoding="utf-8"?>
+<p:sld xmlns:a="http://schemas.openxmlformats.org/drawingml/2006/main" xmlns:r="http://schemas.openxmlformats.org/officeDocument/2006/relationships" xmlns:p="http://schemas.openxmlformats.org/presentationml/2006/main">
+  <p:cSld>
+    <p:spTree>
+      <p:nvGrpSpPr>
+        <p:cNvPr id="1" name=""/>
+        <p:cNvGrpSpPr/>
+        <p:nvPr/>
+      </p:nvGrpSpPr>
+      <p:grpSpPr>
+        <a:xfrm>
+          <a:off x="0" y="0"/>
+          <a:ext cx="0" cy="0"/>
+          <a:chOff x="0" y="0"/>
+          <a:chExt cx="0" cy="0"/>
+        </a:xfrm>
+      </p:grpSpPr>
+      <p:sp>
+        <p:nvSpPr>
+          <p:cNvPr id="2" name="Τίτλος 1"/>
+          <p:cNvSpPr>
+            <a:spLocks noGrp="1"/>
+          </p:cNvSpPr>
+          <p:nvPr>
+            <p:ph type="title"/>
+          </p:nvPr>
+        </p:nvSpPr>
+        <p:spPr/>
+        <p:txBody>
+          <a:bodyPr/>
+          <a:lstStyle/>
+          <a:p>
+            <a:r>
+              <a:rPr lang="en-US" dirty="0" smtClean="0"/>
               <a:t>Case 5</a:t>
             </a:r>
             <a:endParaRPr lang="el-GR" dirty="0"/>
@@ -3246,7 +3397,7 @@
 </p:sld>
 </file>
 
-<file path=ppt/slides/slide11.xml><?xml version="1.0" encoding="utf-8"?>
+<file path=ppt/slides/slide12.xml><?xml version="1.0" encoding="utf-8"?>
 <p:sld xmlns:a="http://schemas.openxmlformats.org/drawingml/2006/main" xmlns:r="http://schemas.openxmlformats.org/officeDocument/2006/relationships" xmlns:p="http://schemas.openxmlformats.org/presentationml/2006/main">
   <p:cSld>
     <p:spTree>
@@ -3391,7 +3542,7 @@
 </p:sld>
 </file>
 
-<file path=ppt/slides/slide12.xml><?xml version="1.0" encoding="utf-8"?>
+<file path=ppt/slides/slide13.xml><?xml version="1.0" encoding="utf-8"?>
 <p:sld xmlns:a="http://schemas.openxmlformats.org/drawingml/2006/main" xmlns:r="http://schemas.openxmlformats.org/officeDocument/2006/relationships" xmlns:p="http://schemas.openxmlformats.org/presentationml/2006/main">
   <p:cSld>
     <p:spTree>
@@ -3514,6 +3665,1013 @@
 </p:sld>
 </file>
 
+<file path=ppt/slides/slide14.xml><?xml version="1.0" encoding="utf-8"?>
+<p:sld xmlns:a="http://schemas.openxmlformats.org/drawingml/2006/main" xmlns:r="http://schemas.openxmlformats.org/officeDocument/2006/relationships" xmlns:p="http://schemas.openxmlformats.org/presentationml/2006/main">
+  <p:cSld>
+    <p:spTree>
+      <p:nvGrpSpPr>
+        <p:cNvPr id="1" name=""/>
+        <p:cNvGrpSpPr/>
+        <p:nvPr/>
+      </p:nvGrpSpPr>
+      <p:grpSpPr>
+        <a:xfrm>
+          <a:off x="0" y="0"/>
+          <a:ext cx="0" cy="0"/>
+          <a:chOff x="0" y="0"/>
+          <a:chExt cx="0" cy="0"/>
+        </a:xfrm>
+      </p:grpSpPr>
+      <p:sp>
+        <p:nvSpPr>
+          <p:cNvPr id="2" name="Τίτλος 1"/>
+          <p:cNvSpPr>
+            <a:spLocks noGrp="1"/>
+          </p:cNvSpPr>
+          <p:nvPr>
+            <p:ph type="title"/>
+          </p:nvPr>
+        </p:nvSpPr>
+        <p:spPr/>
+        <p:txBody>
+          <a:bodyPr/>
+          <a:lstStyle/>
+          <a:p>
+            <a:r>
+              <a:rPr lang="en-US" dirty="0" smtClean="0"/>
+              <a:t>Test Barrel Shifter</a:t>
+            </a:r>
+            <a:endParaRPr lang="el-GR" dirty="0"/>
+          </a:p>
+        </p:txBody>
+      </p:sp>
+      <p:sp>
+        <p:nvSpPr>
+          <p:cNvPr id="3" name="Θέση περιεχομένου 2"/>
+          <p:cNvSpPr>
+            <a:spLocks noGrp="1"/>
+          </p:cNvSpPr>
+          <p:nvPr>
+            <p:ph idx="1"/>
+          </p:nvPr>
+        </p:nvSpPr>
+        <p:spPr/>
+        <p:txBody>
+          <a:bodyPr/>
+          <a:lstStyle/>
+          <a:p>
+            <a:pPr marL="0" indent="0">
+              <a:buNone/>
+            </a:pPr>
+            <a:endParaRPr lang="el-GR" dirty="0"/>
+          </a:p>
+        </p:txBody>
+      </p:sp>
+      <p:pic>
+        <p:nvPicPr>
+          <p:cNvPr id="1026" name="Picture 2" descr="C:\Users\Aggelos\Downloads\barrelShifter-TestBS.drawio.png"/>
+          <p:cNvPicPr>
+            <a:picLocks noChangeAspect="1" noChangeArrowheads="1"/>
+          </p:cNvPicPr>
+          <p:nvPr/>
+        </p:nvPicPr>
+        <p:blipFill>
+          <a:blip r:embed="rId2">
+            <a:extLst>
+              <a:ext uri="{28A0092B-C50C-407E-A947-70E740481C1C}">
+                <a14:useLocalDpi xmlns:a14="http://schemas.microsoft.com/office/drawing/2010/main" val="0"/>
+              </a:ext>
+            </a:extLst>
+          </a:blip>
+          <a:srcRect/>
+          <a:stretch>
+            <a:fillRect/>
+          </a:stretch>
+        </p:blipFill>
+        <p:spPr bwMode="auto">
+          <a:xfrm>
+            <a:off x="350520" y="1196752"/>
+            <a:ext cx="8442960" cy="5113020"/>
+          </a:xfrm>
+          <a:prstGeom prst="rect">
+            <a:avLst/>
+          </a:prstGeom>
+          <a:noFill/>
+          <a:extLst>
+            <a:ext uri="{909E8E84-426E-40DD-AFC4-6F175D3DCCD1}">
+              <a14:hiddenFill xmlns:a14="http://schemas.microsoft.com/office/drawing/2010/main">
+                <a:solidFill>
+                  <a:srgbClr val="FFFFFF"/>
+                </a:solidFill>
+              </a14:hiddenFill>
+            </a:ext>
+          </a:extLst>
+        </p:spPr>
+      </p:pic>
+    </p:spTree>
+    <p:extLst>
+      <p:ext uri="{BB962C8B-B14F-4D97-AF65-F5344CB8AC3E}">
+        <p14:creationId xmlns:p14="http://schemas.microsoft.com/office/powerpoint/2010/main" val="4246320170"/>
+      </p:ext>
+    </p:extLst>
+  </p:cSld>
+  <p:clrMapOvr>
+    <a:masterClrMapping/>
+  </p:clrMapOvr>
+</p:sld>
+</file>
+
+<file path=ppt/slides/slide15.xml><?xml version="1.0" encoding="utf-8"?>
+<p:sld xmlns:a="http://schemas.openxmlformats.org/drawingml/2006/main" xmlns:r="http://schemas.openxmlformats.org/officeDocument/2006/relationships" xmlns:p="http://schemas.openxmlformats.org/presentationml/2006/main">
+  <p:cSld>
+    <p:spTree>
+      <p:nvGrpSpPr>
+        <p:cNvPr id="1" name=""/>
+        <p:cNvGrpSpPr/>
+        <p:nvPr/>
+      </p:nvGrpSpPr>
+      <p:grpSpPr>
+        <a:xfrm>
+          <a:off x="0" y="0"/>
+          <a:ext cx="0" cy="0"/>
+          <a:chOff x="0" y="0"/>
+          <a:chExt cx="0" cy="0"/>
+        </a:xfrm>
+      </p:grpSpPr>
+      <p:sp>
+        <p:nvSpPr>
+          <p:cNvPr id="2" name="Τίτλος 1"/>
+          <p:cNvSpPr>
+            <a:spLocks noGrp="1"/>
+          </p:cNvSpPr>
+          <p:nvPr>
+            <p:ph type="title"/>
+          </p:nvPr>
+        </p:nvSpPr>
+        <p:spPr>
+          <a:xfrm>
+            <a:off x="467544" y="133331"/>
+            <a:ext cx="8229600" cy="1143000"/>
+          </a:xfrm>
+        </p:spPr>
+        <p:txBody>
+          <a:bodyPr>
+            <a:normAutofit fontScale="90000"/>
+          </a:bodyPr>
+          <a:lstStyle/>
+          <a:p>
+            <a:r>
+              <a:rPr lang="en-US" dirty="0" smtClean="0"/>
+              <a:t>Case 1 (</a:t>
+            </a:r>
+            <a:r>
+              <a:rPr lang="en-US" dirty="0"/>
+              <a:t>all of Read and Write Data of transfer are </a:t>
+            </a:r>
+            <a:r>
+              <a:rPr lang="en-US" dirty="0" smtClean="0"/>
+              <a:t>in </a:t>
+            </a:r>
+            <a:r>
+              <a:rPr lang="en-US" dirty="0"/>
+              <a:t>one line respectively </a:t>
+            </a:r>
+            <a:r>
+              <a:rPr lang="en-US" dirty="0" smtClean="0"/>
+              <a:t>)</a:t>
+            </a:r>
+            <a:endParaRPr lang="el-GR" dirty="0"/>
+          </a:p>
+        </p:txBody>
+      </p:sp>
+      <p:pic>
+        <p:nvPicPr>
+          <p:cNvPr id="3074" name="Picture 2"/>
+          <p:cNvPicPr>
+            <a:picLocks noChangeAspect="1" noChangeArrowheads="1"/>
+          </p:cNvPicPr>
+          <p:nvPr/>
+        </p:nvPicPr>
+        <p:blipFill>
+          <a:blip r:embed="rId2">
+            <a:extLst>
+              <a:ext uri="{28A0092B-C50C-407E-A947-70E740481C1C}">
+                <a14:useLocalDpi xmlns:a14="http://schemas.microsoft.com/office/drawing/2010/main" val="0"/>
+              </a:ext>
+            </a:extLst>
+          </a:blip>
+          <a:srcRect/>
+          <a:stretch>
+            <a:fillRect/>
+          </a:stretch>
+        </p:blipFill>
+        <p:spPr bwMode="auto">
+          <a:xfrm>
+            <a:off x="179932" y="1268760"/>
+            <a:ext cx="8210550" cy="4464496"/>
+          </a:xfrm>
+          <a:prstGeom prst="rect">
+            <a:avLst/>
+          </a:prstGeom>
+          <a:noFill/>
+          <a:ln>
+            <a:noFill/>
+          </a:ln>
+          <a:effectLst/>
+          <a:extLst>
+            <a:ext uri="{909E8E84-426E-40DD-AFC4-6F175D3DCCD1}">
+              <a14:hiddenFill xmlns:a14="http://schemas.microsoft.com/office/drawing/2010/main">
+                <a:solidFill>
+                  <a:schemeClr val="accent1"/>
+                </a:solidFill>
+              </a14:hiddenFill>
+            </a:ext>
+            <a:ext uri="{91240B29-F687-4F45-9708-019B960494DF}">
+              <a14:hiddenLine xmlns:a14="http://schemas.microsoft.com/office/drawing/2010/main" w="9525">
+                <a:solidFill>
+                  <a:schemeClr val="tx1"/>
+                </a:solidFill>
+                <a:miter lim="800000"/>
+                <a:headEnd/>
+                <a:tailEnd/>
+              </a14:hiddenLine>
+            </a:ext>
+            <a:ext uri="{AF507438-7753-43E0-B8FC-AC1667EBCBE1}">
+              <a14:hiddenEffects xmlns:a14="http://schemas.microsoft.com/office/drawing/2010/main">
+                <a:effectLst>
+                  <a:outerShdw dist="35921" dir="2700000" algn="ctr" rotWithShape="0">
+                    <a:schemeClr val="bg2"/>
+                  </a:outerShdw>
+                </a:effectLst>
+              </a14:hiddenEffects>
+            </a:ext>
+          </a:extLst>
+        </p:spPr>
+      </p:pic>
+      <p:sp>
+        <p:nvSpPr>
+          <p:cNvPr id="6" name="Ορθογώνιο 5"/>
+          <p:cNvSpPr/>
+          <p:nvPr/>
+        </p:nvSpPr>
+        <p:spPr>
+          <a:xfrm>
+            <a:off x="683568" y="5949279"/>
+            <a:ext cx="8207673" cy="646331"/>
+          </a:xfrm>
+          <a:prstGeom prst="rect">
+            <a:avLst/>
+          </a:prstGeom>
+        </p:spPr>
+        <p:txBody>
+          <a:bodyPr wrap="square">
+            <a:spAutoFit/>
+          </a:bodyPr>
+          <a:lstStyle/>
+          <a:p>
+            <a:r>
+              <a:rPr lang="en-US" dirty="0" smtClean="0"/>
+              <a:t>After 1</a:t>
+            </a:r>
+            <a:r>
+              <a:rPr lang="en-US" baseline="30000" dirty="0" smtClean="0"/>
+              <a:t>st</a:t>
+            </a:r>
+            <a:r>
+              <a:rPr lang="en-US" dirty="0" smtClean="0"/>
+              <a:t> Data Write all of Bytes have been because all of Read and Write Data of transfer are all in one line respectively sent so state stays in Start State </a:t>
+            </a:r>
+            <a:endParaRPr lang="el-GR" dirty="0"/>
+          </a:p>
+        </p:txBody>
+      </p:sp>
+    </p:spTree>
+    <p:extLst>
+      <p:ext uri="{BB962C8B-B14F-4D97-AF65-F5344CB8AC3E}">
+        <p14:creationId xmlns:p14="http://schemas.microsoft.com/office/powerpoint/2010/main" val="1254560384"/>
+      </p:ext>
+    </p:extLst>
+  </p:cSld>
+  <p:clrMapOvr>
+    <a:masterClrMapping/>
+  </p:clrMapOvr>
+</p:sld>
+</file>
+
+<file path=ppt/slides/slide16.xml><?xml version="1.0" encoding="utf-8"?>
+<p:sld xmlns:a="http://schemas.openxmlformats.org/drawingml/2006/main" xmlns:r="http://schemas.openxmlformats.org/officeDocument/2006/relationships" xmlns:p="http://schemas.openxmlformats.org/presentationml/2006/main">
+  <p:cSld>
+    <p:spTree>
+      <p:nvGrpSpPr>
+        <p:cNvPr id="1" name=""/>
+        <p:cNvGrpSpPr/>
+        <p:nvPr/>
+      </p:nvGrpSpPr>
+      <p:grpSpPr>
+        <a:xfrm>
+          <a:off x="0" y="0"/>
+          <a:ext cx="0" cy="0"/>
+          <a:chOff x="0" y="0"/>
+          <a:chExt cx="0" cy="0"/>
+        </a:xfrm>
+      </p:grpSpPr>
+      <p:sp>
+        <p:nvSpPr>
+          <p:cNvPr id="2" name="Τίτλος 1"/>
+          <p:cNvSpPr>
+            <a:spLocks noGrp="1"/>
+          </p:cNvSpPr>
+          <p:nvPr>
+            <p:ph type="title"/>
+          </p:nvPr>
+        </p:nvSpPr>
+        <p:spPr/>
+        <p:txBody>
+          <a:bodyPr/>
+          <a:lstStyle/>
+          <a:p>
+            <a:r>
+              <a:rPr lang="en-US" dirty="0" smtClean="0"/>
+              <a:t>Case 2 (Aligned Transfer)</a:t>
+            </a:r>
+            <a:endParaRPr lang="el-GR" dirty="0"/>
+          </a:p>
+        </p:txBody>
+      </p:sp>
+      <p:pic>
+        <p:nvPicPr>
+          <p:cNvPr id="4098" name="Picture 2"/>
+          <p:cNvPicPr>
+            <a:picLocks noChangeAspect="1" noChangeArrowheads="1"/>
+          </p:cNvPicPr>
+          <p:nvPr/>
+        </p:nvPicPr>
+        <p:blipFill>
+          <a:blip r:embed="rId2">
+            <a:extLst>
+              <a:ext uri="{28A0092B-C50C-407E-A947-70E740481C1C}">
+                <a14:useLocalDpi xmlns:a14="http://schemas.microsoft.com/office/drawing/2010/main" val="0"/>
+              </a:ext>
+            </a:extLst>
+          </a:blip>
+          <a:srcRect/>
+          <a:stretch>
+            <a:fillRect/>
+          </a:stretch>
+        </p:blipFill>
+        <p:spPr bwMode="auto">
+          <a:xfrm>
+            <a:off x="323528" y="1264818"/>
+            <a:ext cx="8204200" cy="3949700"/>
+          </a:xfrm>
+          <a:prstGeom prst="rect">
+            <a:avLst/>
+          </a:prstGeom>
+          <a:noFill/>
+          <a:ln>
+            <a:noFill/>
+          </a:ln>
+          <a:effectLst/>
+          <a:extLst>
+            <a:ext uri="{909E8E84-426E-40DD-AFC4-6F175D3DCCD1}">
+              <a14:hiddenFill xmlns:a14="http://schemas.microsoft.com/office/drawing/2010/main">
+                <a:solidFill>
+                  <a:schemeClr val="accent1"/>
+                </a:solidFill>
+              </a14:hiddenFill>
+            </a:ext>
+            <a:ext uri="{91240B29-F687-4F45-9708-019B960494DF}">
+              <a14:hiddenLine xmlns:a14="http://schemas.microsoft.com/office/drawing/2010/main" w="9525">
+                <a:solidFill>
+                  <a:schemeClr val="tx1"/>
+                </a:solidFill>
+                <a:miter lim="800000"/>
+                <a:headEnd/>
+                <a:tailEnd/>
+              </a14:hiddenLine>
+            </a:ext>
+            <a:ext uri="{AF507438-7753-43E0-B8FC-AC1667EBCBE1}">
+              <a14:hiddenEffects xmlns:a14="http://schemas.microsoft.com/office/drawing/2010/main">
+                <a:effectLst>
+                  <a:outerShdw dist="35921" dir="2700000" algn="ctr" rotWithShape="0">
+                    <a:schemeClr val="bg2"/>
+                  </a:outerShdw>
+                </a:effectLst>
+              </a14:hiddenEffects>
+            </a:ext>
+          </a:extLst>
+        </p:spPr>
+      </p:pic>
+      <p:sp>
+        <p:nvSpPr>
+          <p:cNvPr id="5" name="Ορθογώνιο 4"/>
+          <p:cNvSpPr/>
+          <p:nvPr/>
+        </p:nvSpPr>
+        <p:spPr>
+          <a:xfrm>
+            <a:off x="611560" y="5672533"/>
+            <a:ext cx="8207673" cy="646331"/>
+          </a:xfrm>
+          <a:prstGeom prst="rect">
+            <a:avLst/>
+          </a:prstGeom>
+        </p:spPr>
+        <p:txBody>
+          <a:bodyPr wrap="square">
+            <a:spAutoFit/>
+          </a:bodyPr>
+          <a:lstStyle/>
+          <a:p>
+            <a:r>
+              <a:rPr lang="en-US" dirty="0" smtClean="0"/>
+              <a:t>1 aligned Data transfer contains 3 Data Writes which do not need Shift and for this reason State stays in Start State for all of 3 </a:t>
+            </a:r>
+            <a:r>
+              <a:rPr lang="en-US" dirty="0" err="1" smtClean="0"/>
+              <a:t>Txns</a:t>
+            </a:r>
+            <a:r>
+              <a:rPr lang="en-US" dirty="0" smtClean="0"/>
+              <a:t>.</a:t>
+            </a:r>
+            <a:endParaRPr lang="el-GR" dirty="0"/>
+          </a:p>
+        </p:txBody>
+      </p:sp>
+    </p:spTree>
+    <p:extLst>
+      <p:ext uri="{BB962C8B-B14F-4D97-AF65-F5344CB8AC3E}">
+        <p14:creationId xmlns:p14="http://schemas.microsoft.com/office/powerpoint/2010/main" val="2992752601"/>
+      </p:ext>
+    </p:extLst>
+  </p:cSld>
+  <p:clrMapOvr>
+    <a:masterClrMapping/>
+  </p:clrMapOvr>
+</p:sld>
+</file>
+
+<file path=ppt/slides/slide17.xml><?xml version="1.0" encoding="utf-8"?>
+<p:sld xmlns:a="http://schemas.openxmlformats.org/drawingml/2006/main" xmlns:r="http://schemas.openxmlformats.org/officeDocument/2006/relationships" xmlns:p="http://schemas.openxmlformats.org/presentationml/2006/main">
+  <p:cSld>
+    <p:spTree>
+      <p:nvGrpSpPr>
+        <p:cNvPr id="1" name=""/>
+        <p:cNvGrpSpPr/>
+        <p:nvPr/>
+      </p:nvGrpSpPr>
+      <p:grpSpPr>
+        <a:xfrm>
+          <a:off x="0" y="0"/>
+          <a:ext cx="0" cy="0"/>
+          <a:chOff x="0" y="0"/>
+          <a:chExt cx="0" cy="0"/>
+        </a:xfrm>
+      </p:grpSpPr>
+      <p:sp>
+        <p:nvSpPr>
+          <p:cNvPr id="2" name="Τίτλος 1"/>
+          <p:cNvSpPr>
+            <a:spLocks noGrp="1"/>
+          </p:cNvSpPr>
+          <p:nvPr>
+            <p:ph type="title"/>
+          </p:nvPr>
+        </p:nvSpPr>
+        <p:spPr/>
+        <p:txBody>
+          <a:bodyPr>
+            <a:normAutofit fontScale="90000"/>
+          </a:bodyPr>
+          <a:lstStyle/>
+          <a:p>
+            <a:r>
+              <a:rPr lang="en-US" dirty="0" smtClean="0"/>
+              <a:t>Case 3 (</a:t>
+            </a:r>
+            <a:r>
+              <a:rPr lang="en-US" dirty="0"/>
+              <a:t>Shift left </a:t>
+            </a:r>
+            <a:r>
+              <a:rPr lang="en-US" dirty="0" smtClean="0"/>
+              <a:t> </a:t>
+            </a:r>
+            <a:r>
+              <a:rPr lang="en-US" dirty="0" err="1" smtClean="0"/>
+              <a:t>NumbOfRead</a:t>
+            </a:r>
+            <a:r>
+              <a:rPr lang="en-US" dirty="0" smtClean="0"/>
+              <a:t> </a:t>
+            </a:r>
+            <a:r>
+              <a:rPr lang="en-US" dirty="0"/>
+              <a:t>== </a:t>
+            </a:r>
+            <a:r>
+              <a:rPr lang="en-US" dirty="0" err="1"/>
+              <a:t>NumOfWrite</a:t>
+            </a:r>
+            <a:r>
+              <a:rPr lang="en-US" dirty="0"/>
+              <a:t> </a:t>
+            </a:r>
+            <a:r>
+              <a:rPr lang="en-US" dirty="0" smtClean="0"/>
+              <a:t>)</a:t>
+            </a:r>
+            <a:endParaRPr lang="el-GR" dirty="0"/>
+          </a:p>
+        </p:txBody>
+      </p:sp>
+      <p:pic>
+        <p:nvPicPr>
+          <p:cNvPr id="5122" name="Picture 2"/>
+          <p:cNvPicPr>
+            <a:picLocks noChangeAspect="1" noChangeArrowheads="1"/>
+          </p:cNvPicPr>
+          <p:nvPr/>
+        </p:nvPicPr>
+        <p:blipFill>
+          <a:blip r:embed="rId2">
+            <a:extLst>
+              <a:ext uri="{28A0092B-C50C-407E-A947-70E740481C1C}">
+                <a14:useLocalDpi xmlns:a14="http://schemas.microsoft.com/office/drawing/2010/main" val="0"/>
+              </a:ext>
+            </a:extLst>
+          </a:blip>
+          <a:srcRect/>
+          <a:stretch>
+            <a:fillRect/>
+          </a:stretch>
+        </p:blipFill>
+        <p:spPr bwMode="auto">
+          <a:xfrm>
+            <a:off x="401412" y="1340768"/>
+            <a:ext cx="8020050" cy="4413250"/>
+          </a:xfrm>
+          <a:prstGeom prst="rect">
+            <a:avLst/>
+          </a:prstGeom>
+          <a:noFill/>
+          <a:ln>
+            <a:noFill/>
+          </a:ln>
+          <a:effectLst/>
+          <a:extLst>
+            <a:ext uri="{909E8E84-426E-40DD-AFC4-6F175D3DCCD1}">
+              <a14:hiddenFill xmlns:a14="http://schemas.microsoft.com/office/drawing/2010/main">
+                <a:solidFill>
+                  <a:schemeClr val="accent1"/>
+                </a:solidFill>
+              </a14:hiddenFill>
+            </a:ext>
+            <a:ext uri="{91240B29-F687-4F45-9708-019B960494DF}">
+              <a14:hiddenLine xmlns:a14="http://schemas.microsoft.com/office/drawing/2010/main" w="9525">
+                <a:solidFill>
+                  <a:schemeClr val="tx1"/>
+                </a:solidFill>
+                <a:miter lim="800000"/>
+                <a:headEnd/>
+                <a:tailEnd/>
+              </a14:hiddenLine>
+            </a:ext>
+            <a:ext uri="{AF507438-7753-43E0-B8FC-AC1667EBCBE1}">
+              <a14:hiddenEffects xmlns:a14="http://schemas.microsoft.com/office/drawing/2010/main">
+                <a:effectLst>
+                  <a:outerShdw dist="35921" dir="2700000" algn="ctr" rotWithShape="0">
+                    <a:schemeClr val="bg2"/>
+                  </a:outerShdw>
+                </a:effectLst>
+              </a14:hiddenEffects>
+            </a:ext>
+          </a:extLst>
+        </p:spPr>
+      </p:pic>
+      <p:sp>
+        <p:nvSpPr>
+          <p:cNvPr id="5" name="Ορθογώνιο 4"/>
+          <p:cNvSpPr/>
+          <p:nvPr/>
+        </p:nvSpPr>
+        <p:spPr>
+          <a:xfrm>
+            <a:off x="591955" y="5973601"/>
+            <a:ext cx="8207673" cy="923330"/>
+          </a:xfrm>
+          <a:prstGeom prst="rect">
+            <a:avLst/>
+          </a:prstGeom>
+        </p:spPr>
+        <p:txBody>
+          <a:bodyPr wrap="square">
+            <a:spAutoFit/>
+          </a:bodyPr>
+          <a:lstStyle/>
+          <a:p>
+            <a:r>
+              <a:rPr lang="en-US" dirty="0" smtClean="0"/>
+              <a:t>Because of left shift after first </a:t>
+            </a:r>
+            <a:r>
+              <a:rPr lang="en-US" dirty="0" err="1" smtClean="0"/>
+              <a:t>Dequeue</a:t>
+            </a:r>
+            <a:r>
+              <a:rPr lang="en-US" dirty="0" smtClean="0"/>
+              <a:t> BS State goes to Merge State where executes the next shift and merge for the next Write and finally after the last transaction it returns to Start State</a:t>
+            </a:r>
+            <a:endParaRPr lang="el-GR" dirty="0"/>
+          </a:p>
+        </p:txBody>
+      </p:sp>
+    </p:spTree>
+    <p:extLst>
+      <p:ext uri="{BB962C8B-B14F-4D97-AF65-F5344CB8AC3E}">
+        <p14:creationId xmlns:p14="http://schemas.microsoft.com/office/powerpoint/2010/main" val="2087154617"/>
+      </p:ext>
+    </p:extLst>
+  </p:cSld>
+  <p:clrMapOvr>
+    <a:masterClrMapping/>
+  </p:clrMapOvr>
+</p:sld>
+</file>
+
+<file path=ppt/slides/slide18.xml><?xml version="1.0" encoding="utf-8"?>
+<p:sld xmlns:a="http://schemas.openxmlformats.org/drawingml/2006/main" xmlns:r="http://schemas.openxmlformats.org/officeDocument/2006/relationships" xmlns:p="http://schemas.openxmlformats.org/presentationml/2006/main">
+  <p:cSld>
+    <p:spTree>
+      <p:nvGrpSpPr>
+        <p:cNvPr id="1" name=""/>
+        <p:cNvGrpSpPr/>
+        <p:nvPr/>
+      </p:nvGrpSpPr>
+      <p:grpSpPr>
+        <a:xfrm>
+          <a:off x="0" y="0"/>
+          <a:ext cx="0" cy="0"/>
+          <a:chOff x="0" y="0"/>
+          <a:chExt cx="0" cy="0"/>
+        </a:xfrm>
+      </p:grpSpPr>
+      <p:sp>
+        <p:nvSpPr>
+          <p:cNvPr id="2" name="Τίτλος 1"/>
+          <p:cNvSpPr>
+            <a:spLocks noGrp="1"/>
+          </p:cNvSpPr>
+          <p:nvPr>
+            <p:ph type="title"/>
+          </p:nvPr>
+        </p:nvSpPr>
+        <p:spPr/>
+        <p:txBody>
+          <a:bodyPr>
+            <a:normAutofit fontScale="90000"/>
+          </a:bodyPr>
+          <a:lstStyle/>
+          <a:p>
+            <a:r>
+              <a:rPr lang="en-US" dirty="0" smtClean="0"/>
+              <a:t>Case 4 (</a:t>
+            </a:r>
+            <a:r>
+              <a:rPr lang="en-US" dirty="0"/>
+              <a:t>Shift left </a:t>
+            </a:r>
+            <a:br>
+              <a:rPr lang="en-US" dirty="0"/>
+            </a:br>
+            <a:r>
+              <a:rPr lang="en-US" dirty="0" err="1"/>
+              <a:t>NumbOfRead</a:t>
+            </a:r>
+            <a:r>
+              <a:rPr lang="en-US" dirty="0"/>
+              <a:t> != </a:t>
+            </a:r>
+            <a:r>
+              <a:rPr lang="en-US" dirty="0" err="1"/>
+              <a:t>NumOfWrite</a:t>
+            </a:r>
+            <a:r>
+              <a:rPr lang="en-US" dirty="0"/>
+              <a:t> </a:t>
+            </a:r>
+            <a:r>
+              <a:rPr lang="en-US" dirty="0" smtClean="0"/>
+              <a:t>)</a:t>
+            </a:r>
+            <a:endParaRPr lang="el-GR" dirty="0"/>
+          </a:p>
+        </p:txBody>
+      </p:sp>
+      <p:sp>
+        <p:nvSpPr>
+          <p:cNvPr id="3" name="Θέση περιεχομένου 2"/>
+          <p:cNvSpPr>
+            <a:spLocks noGrp="1"/>
+          </p:cNvSpPr>
+          <p:nvPr>
+            <p:ph idx="1"/>
+          </p:nvPr>
+        </p:nvSpPr>
+        <p:spPr>
+          <a:xfrm>
+            <a:off x="539552" y="5733256"/>
+            <a:ext cx="8352928" cy="1008112"/>
+          </a:xfrm>
+        </p:spPr>
+        <p:txBody>
+          <a:bodyPr>
+            <a:normAutofit fontScale="77500" lnSpcReduction="20000"/>
+          </a:bodyPr>
+          <a:lstStyle/>
+          <a:p>
+            <a:pPr marL="0" indent="0">
+              <a:buNone/>
+            </a:pPr>
+            <a:r>
+              <a:rPr lang="en-US" dirty="0" smtClean="0"/>
+              <a:t>After First Write State goes to Merge State where executes the next transaction and then it goes to Extra Write State where for the last write transaction </a:t>
+            </a:r>
+            <a:endParaRPr lang="el-GR" dirty="0"/>
+          </a:p>
+        </p:txBody>
+      </p:sp>
+      <p:pic>
+        <p:nvPicPr>
+          <p:cNvPr id="6146" name="Picture 2"/>
+          <p:cNvPicPr>
+            <a:picLocks noChangeAspect="1" noChangeArrowheads="1"/>
+          </p:cNvPicPr>
+          <p:nvPr/>
+        </p:nvPicPr>
+        <p:blipFill rotWithShape="1">
+          <a:blip r:embed="rId2">
+            <a:extLst>
+              <a:ext uri="{28A0092B-C50C-407E-A947-70E740481C1C}">
+                <a14:useLocalDpi xmlns:a14="http://schemas.microsoft.com/office/drawing/2010/main" val="0"/>
+              </a:ext>
+            </a:extLst>
+          </a:blip>
+          <a:srcRect t="2293" b="-232"/>
+          <a:stretch/>
+        </p:blipFill>
+        <p:spPr bwMode="auto">
+          <a:xfrm>
+            <a:off x="756415" y="1412776"/>
+            <a:ext cx="7344816" cy="4032448"/>
+          </a:xfrm>
+          <a:prstGeom prst="rect">
+            <a:avLst/>
+          </a:prstGeom>
+          <a:noFill/>
+          <a:ln>
+            <a:noFill/>
+          </a:ln>
+          <a:effectLst/>
+          <a:extLst>
+            <a:ext uri="{909E8E84-426E-40DD-AFC4-6F175D3DCCD1}">
+              <a14:hiddenFill xmlns:a14="http://schemas.microsoft.com/office/drawing/2010/main">
+                <a:solidFill>
+                  <a:schemeClr val="accent1"/>
+                </a:solidFill>
+              </a14:hiddenFill>
+            </a:ext>
+            <a:ext uri="{91240B29-F687-4F45-9708-019B960494DF}">
+              <a14:hiddenLine xmlns:a14="http://schemas.microsoft.com/office/drawing/2010/main" w="9525">
+                <a:solidFill>
+                  <a:schemeClr val="tx1"/>
+                </a:solidFill>
+                <a:miter lim="800000"/>
+                <a:headEnd/>
+                <a:tailEnd/>
+              </a14:hiddenLine>
+            </a:ext>
+            <a:ext uri="{AF507438-7753-43E0-B8FC-AC1667EBCBE1}">
+              <a14:hiddenEffects xmlns:a14="http://schemas.microsoft.com/office/drawing/2010/main">
+                <a:effectLst>
+                  <a:outerShdw dist="35921" dir="2700000" algn="ctr" rotWithShape="0">
+                    <a:schemeClr val="bg2"/>
+                  </a:outerShdw>
+                </a:effectLst>
+              </a14:hiddenEffects>
+            </a:ext>
+          </a:extLst>
+        </p:spPr>
+      </p:pic>
+    </p:spTree>
+    <p:extLst>
+      <p:ext uri="{BB962C8B-B14F-4D97-AF65-F5344CB8AC3E}">
+        <p14:creationId xmlns:p14="http://schemas.microsoft.com/office/powerpoint/2010/main" val="3665523802"/>
+      </p:ext>
+    </p:extLst>
+  </p:cSld>
+  <p:clrMapOvr>
+    <a:masterClrMapping/>
+  </p:clrMapOvr>
+</p:sld>
+</file>
+
+<file path=ppt/slides/slide19.xml><?xml version="1.0" encoding="utf-8"?>
+<p:sld xmlns:a="http://schemas.openxmlformats.org/drawingml/2006/main" xmlns:r="http://schemas.openxmlformats.org/officeDocument/2006/relationships" xmlns:p="http://schemas.openxmlformats.org/presentationml/2006/main">
+  <p:cSld>
+    <p:spTree>
+      <p:nvGrpSpPr>
+        <p:cNvPr id="1" name=""/>
+        <p:cNvGrpSpPr/>
+        <p:nvPr/>
+      </p:nvGrpSpPr>
+      <p:grpSpPr>
+        <a:xfrm>
+          <a:off x="0" y="0"/>
+          <a:ext cx="0" cy="0"/>
+          <a:chOff x="0" y="0"/>
+          <a:chExt cx="0" cy="0"/>
+        </a:xfrm>
+      </p:grpSpPr>
+      <p:sp>
+        <p:nvSpPr>
+          <p:cNvPr id="2" name="Τίτλος 1"/>
+          <p:cNvSpPr>
+            <a:spLocks noGrp="1"/>
+          </p:cNvSpPr>
+          <p:nvPr>
+            <p:ph type="title"/>
+          </p:nvPr>
+        </p:nvSpPr>
+        <p:spPr/>
+        <p:txBody>
+          <a:bodyPr>
+            <a:normAutofit fontScale="90000"/>
+          </a:bodyPr>
+          <a:lstStyle/>
+          <a:p>
+            <a:r>
+              <a:rPr lang="en-US" dirty="0" smtClean="0"/>
+              <a:t>Case 5 (</a:t>
+            </a:r>
+            <a:r>
+              <a:rPr lang="en-US" dirty="0"/>
+              <a:t>Shift right</a:t>
+            </a:r>
+            <a:br>
+              <a:rPr lang="en-US" dirty="0"/>
+            </a:br>
+            <a:r>
+              <a:rPr lang="en-US" dirty="0" err="1"/>
+              <a:t>NumbOfRead</a:t>
+            </a:r>
+            <a:r>
+              <a:rPr lang="en-US" dirty="0"/>
+              <a:t> == </a:t>
+            </a:r>
+            <a:r>
+              <a:rPr lang="en-US" dirty="0" err="1"/>
+              <a:t>NumOfWrite</a:t>
+            </a:r>
+            <a:r>
+              <a:rPr lang="en-US" dirty="0"/>
+              <a:t> </a:t>
+            </a:r>
+            <a:r>
+              <a:rPr lang="en-US" dirty="0" smtClean="0"/>
+              <a:t>)</a:t>
+            </a:r>
+            <a:endParaRPr lang="el-GR" dirty="0"/>
+          </a:p>
+        </p:txBody>
+      </p:sp>
+      <p:pic>
+        <p:nvPicPr>
+          <p:cNvPr id="7170" name="Picture 2"/>
+          <p:cNvPicPr>
+            <a:picLocks noChangeAspect="1" noChangeArrowheads="1"/>
+          </p:cNvPicPr>
+          <p:nvPr/>
+        </p:nvPicPr>
+        <p:blipFill>
+          <a:blip r:embed="rId2">
+            <a:extLst>
+              <a:ext uri="{28A0092B-C50C-407E-A947-70E740481C1C}">
+                <a14:useLocalDpi xmlns:a14="http://schemas.microsoft.com/office/drawing/2010/main" val="0"/>
+              </a:ext>
+            </a:extLst>
+          </a:blip>
+          <a:srcRect/>
+          <a:stretch>
+            <a:fillRect/>
+          </a:stretch>
+        </p:blipFill>
+        <p:spPr bwMode="auto">
+          <a:xfrm>
+            <a:off x="288925" y="1511599"/>
+            <a:ext cx="8566150" cy="4400550"/>
+          </a:xfrm>
+          <a:prstGeom prst="rect">
+            <a:avLst/>
+          </a:prstGeom>
+          <a:noFill/>
+          <a:ln>
+            <a:noFill/>
+          </a:ln>
+          <a:effectLst/>
+          <a:extLst>
+            <a:ext uri="{909E8E84-426E-40DD-AFC4-6F175D3DCCD1}">
+              <a14:hiddenFill xmlns:a14="http://schemas.microsoft.com/office/drawing/2010/main">
+                <a:solidFill>
+                  <a:schemeClr val="accent1"/>
+                </a:solidFill>
+              </a14:hiddenFill>
+            </a:ext>
+            <a:ext uri="{91240B29-F687-4F45-9708-019B960494DF}">
+              <a14:hiddenLine xmlns:a14="http://schemas.microsoft.com/office/drawing/2010/main" w="9525">
+                <a:solidFill>
+                  <a:schemeClr val="tx1"/>
+                </a:solidFill>
+                <a:miter lim="800000"/>
+                <a:headEnd/>
+                <a:tailEnd/>
+              </a14:hiddenLine>
+            </a:ext>
+            <a:ext uri="{AF507438-7753-43E0-B8FC-AC1667EBCBE1}">
+              <a14:hiddenEffects xmlns:a14="http://schemas.microsoft.com/office/drawing/2010/main">
+                <a:effectLst>
+                  <a:outerShdw dist="35921" dir="2700000" algn="ctr" rotWithShape="0">
+                    <a:schemeClr val="bg2"/>
+                  </a:outerShdw>
+                </a:effectLst>
+              </a14:hiddenEffects>
+            </a:ext>
+          </a:extLst>
+        </p:spPr>
+      </p:pic>
+      <p:sp>
+        <p:nvSpPr>
+          <p:cNvPr id="5" name="Θέση περιεχομένου 2"/>
+          <p:cNvSpPr>
+            <a:spLocks noGrp="1"/>
+          </p:cNvSpPr>
+          <p:nvPr>
+            <p:ph idx="1"/>
+          </p:nvPr>
+        </p:nvSpPr>
+        <p:spPr>
+          <a:xfrm>
+            <a:off x="539552" y="5912148"/>
+            <a:ext cx="8352928" cy="945851"/>
+          </a:xfrm>
+        </p:spPr>
+        <p:txBody>
+          <a:bodyPr>
+            <a:normAutofit fontScale="62500" lnSpcReduction="20000"/>
+          </a:bodyPr>
+          <a:lstStyle/>
+          <a:p>
+            <a:pPr marL="0" indent="0">
+              <a:buNone/>
+            </a:pPr>
+            <a:r>
+              <a:rPr lang="en-US" dirty="0" smtClean="0"/>
+              <a:t>Because of shift right State goes from Start to Merge without waiting </a:t>
+            </a:r>
+            <a:r>
+              <a:rPr lang="en-US" dirty="0" err="1" smtClean="0"/>
+              <a:t>Dequeue</a:t>
+            </a:r>
+            <a:r>
+              <a:rPr lang="en-US" dirty="0" smtClean="0"/>
+              <a:t> signal where BS does the next 2 shift end merge transaction and then State goes to Extra Write where happens the last </a:t>
+            </a:r>
+            <a:r>
+              <a:rPr lang="en-US" dirty="0" err="1" smtClean="0"/>
+              <a:t>Txn</a:t>
+            </a:r>
+            <a:r>
+              <a:rPr lang="en-US" dirty="0" smtClean="0"/>
+              <a:t> and goes to Start State </a:t>
+            </a:r>
+            <a:endParaRPr lang="el-GR" dirty="0"/>
+          </a:p>
+        </p:txBody>
+      </p:sp>
+    </p:spTree>
+    <p:extLst>
+      <p:ext uri="{BB962C8B-B14F-4D97-AF65-F5344CB8AC3E}">
+        <p14:creationId xmlns:p14="http://schemas.microsoft.com/office/powerpoint/2010/main" val="2167693288"/>
+      </p:ext>
+    </p:extLst>
+  </p:cSld>
+  <p:clrMapOvr>
+    <a:masterClrMapping/>
+  </p:clrMapOvr>
+</p:sld>
+</file>
+
 <file path=ppt/slides/slide2.xml><?xml version="1.0" encoding="utf-8"?>
 <p:sld xmlns:a="http://schemas.openxmlformats.org/drawingml/2006/main" xmlns:r="http://schemas.openxmlformats.org/officeDocument/2006/relationships" xmlns:p="http://schemas.openxmlformats.org/presentationml/2006/main">
   <p:cSld>
@@ -3541,6 +4699,439 @@
             <p:ph type="title"/>
           </p:nvPr>
         </p:nvSpPr>
+        <p:spPr/>
+        <p:txBody>
+          <a:bodyPr/>
+          <a:lstStyle/>
+          <a:p>
+            <a:r>
+              <a:rPr lang="en-US" dirty="0" smtClean="0"/>
+              <a:t>Barrel Shifter</a:t>
+            </a:r>
+            <a:endParaRPr lang="el-GR" dirty="0"/>
+          </a:p>
+        </p:txBody>
+      </p:sp>
+      <p:pic>
+        <p:nvPicPr>
+          <p:cNvPr id="1026" name="Picture 2" descr="C:\Users\Aggelos\Downloads\barrelShifter-BS external.drawio (1).png"/>
+          <p:cNvPicPr>
+            <a:picLocks noChangeAspect="1" noChangeArrowheads="1"/>
+          </p:cNvPicPr>
+          <p:nvPr/>
+        </p:nvPicPr>
+        <p:blipFill rotWithShape="1">
+          <a:blip r:embed="rId2">
+            <a:extLst>
+              <a:ext uri="{28A0092B-C50C-407E-A947-70E740481C1C}">
+                <a14:useLocalDpi xmlns:a14="http://schemas.microsoft.com/office/drawing/2010/main" val="0"/>
+              </a:ext>
+            </a:extLst>
+          </a:blip>
+          <a:srcRect l="22466"/>
+          <a:stretch/>
+        </p:blipFill>
+        <p:spPr bwMode="auto">
+          <a:xfrm>
+            <a:off x="0" y="2157785"/>
+            <a:ext cx="9144000" cy="3287439"/>
+          </a:xfrm>
+          <a:prstGeom prst="rect">
+            <a:avLst/>
+          </a:prstGeom>
+          <a:noFill/>
+          <a:extLst>
+            <a:ext uri="{909E8E84-426E-40DD-AFC4-6F175D3DCCD1}">
+              <a14:hiddenFill xmlns:a14="http://schemas.microsoft.com/office/drawing/2010/main">
+                <a:solidFill>
+                  <a:srgbClr val="FFFFFF"/>
+                </a:solidFill>
+              </a14:hiddenFill>
+            </a:ext>
+          </a:extLst>
+        </p:spPr>
+      </p:pic>
+    </p:spTree>
+    <p:extLst>
+      <p:ext uri="{BB962C8B-B14F-4D97-AF65-F5344CB8AC3E}">
+        <p14:creationId xmlns:p14="http://schemas.microsoft.com/office/powerpoint/2010/main" val="836274892"/>
+      </p:ext>
+    </p:extLst>
+  </p:cSld>
+  <p:clrMapOvr>
+    <a:masterClrMapping/>
+  </p:clrMapOvr>
+</p:sld>
+</file>
+
+<file path=ppt/slides/slide20.xml><?xml version="1.0" encoding="utf-8"?>
+<p:sld xmlns:a="http://schemas.openxmlformats.org/drawingml/2006/main" xmlns:r="http://schemas.openxmlformats.org/officeDocument/2006/relationships" xmlns:p="http://schemas.openxmlformats.org/presentationml/2006/main">
+  <p:cSld>
+    <p:spTree>
+      <p:nvGrpSpPr>
+        <p:cNvPr id="1" name=""/>
+        <p:cNvGrpSpPr/>
+        <p:nvPr/>
+      </p:nvGrpSpPr>
+      <p:grpSpPr>
+        <a:xfrm>
+          <a:off x="0" y="0"/>
+          <a:ext cx="0" cy="0"/>
+          <a:chOff x="0" y="0"/>
+          <a:chExt cx="0" cy="0"/>
+        </a:xfrm>
+      </p:grpSpPr>
+      <p:sp>
+        <p:nvSpPr>
+          <p:cNvPr id="2" name="Τίτλος 1"/>
+          <p:cNvSpPr>
+            <a:spLocks noGrp="1"/>
+          </p:cNvSpPr>
+          <p:nvPr>
+            <p:ph type="title"/>
+          </p:nvPr>
+        </p:nvSpPr>
+        <p:spPr/>
+        <p:txBody>
+          <a:bodyPr>
+            <a:normAutofit fontScale="90000"/>
+          </a:bodyPr>
+          <a:lstStyle/>
+          <a:p>
+            <a:r>
+              <a:rPr lang="en-US" dirty="0" smtClean="0"/>
+              <a:t>Case 6 (</a:t>
+            </a:r>
+            <a:r>
+              <a:rPr lang="en-US" dirty="0"/>
+              <a:t>Shift right</a:t>
+            </a:r>
+            <a:br>
+              <a:rPr lang="en-US" dirty="0"/>
+            </a:br>
+            <a:r>
+              <a:rPr lang="en-US" dirty="0" err="1"/>
+              <a:t>NumbOfRead</a:t>
+            </a:r>
+            <a:r>
+              <a:rPr lang="en-US" dirty="0"/>
+              <a:t> != </a:t>
+            </a:r>
+            <a:r>
+              <a:rPr lang="en-US" dirty="0" err="1"/>
+              <a:t>NumOfWrite</a:t>
+            </a:r>
+            <a:r>
+              <a:rPr lang="en-US" dirty="0"/>
+              <a:t> </a:t>
+            </a:r>
+            <a:r>
+              <a:rPr lang="en-US" dirty="0" smtClean="0"/>
+              <a:t>)</a:t>
+            </a:r>
+            <a:endParaRPr lang="el-GR" dirty="0"/>
+          </a:p>
+        </p:txBody>
+      </p:sp>
+      <p:sp>
+        <p:nvSpPr>
+          <p:cNvPr id="3" name="Θέση περιεχομένου 2"/>
+          <p:cNvSpPr>
+            <a:spLocks noGrp="1"/>
+          </p:cNvSpPr>
+          <p:nvPr>
+            <p:ph idx="1"/>
+          </p:nvPr>
+        </p:nvSpPr>
+        <p:spPr>
+          <a:xfrm>
+            <a:off x="395536" y="5798869"/>
+            <a:ext cx="8748464" cy="1196752"/>
+          </a:xfrm>
+        </p:spPr>
+        <p:txBody>
+          <a:bodyPr>
+            <a:normAutofit fontScale="85000" lnSpcReduction="20000"/>
+          </a:bodyPr>
+          <a:lstStyle/>
+          <a:p>
+            <a:pPr marL="0" indent="0">
+              <a:buNone/>
+            </a:pPr>
+            <a:r>
+              <a:rPr lang="en-US" dirty="0" smtClean="0"/>
+              <a:t>This case is the same with the last one except State doesn’t go to Extra Write State instead after all </a:t>
+            </a:r>
+            <a:r>
+              <a:rPr lang="en-US" dirty="0" err="1" smtClean="0"/>
+              <a:t>Txns</a:t>
+            </a:r>
+            <a:r>
+              <a:rPr lang="en-US" dirty="0" smtClean="0"/>
+              <a:t> are finished it returns to </a:t>
+            </a:r>
+            <a:r>
+              <a:rPr lang="en-US" dirty="0" err="1" smtClean="0"/>
+              <a:t>StartState</a:t>
+            </a:r>
+            <a:endParaRPr lang="el-GR" dirty="0"/>
+          </a:p>
+        </p:txBody>
+      </p:sp>
+      <p:pic>
+        <p:nvPicPr>
+          <p:cNvPr id="8194" name="Picture 2"/>
+          <p:cNvPicPr>
+            <a:picLocks noChangeAspect="1" noChangeArrowheads="1"/>
+          </p:cNvPicPr>
+          <p:nvPr/>
+        </p:nvPicPr>
+        <p:blipFill>
+          <a:blip r:embed="rId2">
+            <a:extLst>
+              <a:ext uri="{28A0092B-C50C-407E-A947-70E740481C1C}">
+                <a14:useLocalDpi xmlns:a14="http://schemas.microsoft.com/office/drawing/2010/main" val="0"/>
+              </a:ext>
+            </a:extLst>
+          </a:blip>
+          <a:srcRect/>
+          <a:stretch>
+            <a:fillRect/>
+          </a:stretch>
+        </p:blipFill>
+        <p:spPr bwMode="auto">
+          <a:xfrm>
+            <a:off x="266700" y="1412776"/>
+            <a:ext cx="8610600" cy="4356100"/>
+          </a:xfrm>
+          <a:prstGeom prst="rect">
+            <a:avLst/>
+          </a:prstGeom>
+          <a:noFill/>
+          <a:ln>
+            <a:noFill/>
+          </a:ln>
+          <a:effectLst/>
+          <a:extLst>
+            <a:ext uri="{909E8E84-426E-40DD-AFC4-6F175D3DCCD1}">
+              <a14:hiddenFill xmlns:a14="http://schemas.microsoft.com/office/drawing/2010/main">
+                <a:solidFill>
+                  <a:schemeClr val="accent1"/>
+                </a:solidFill>
+              </a14:hiddenFill>
+            </a:ext>
+            <a:ext uri="{91240B29-F687-4F45-9708-019B960494DF}">
+              <a14:hiddenLine xmlns:a14="http://schemas.microsoft.com/office/drawing/2010/main" w="9525">
+                <a:solidFill>
+                  <a:schemeClr val="tx1"/>
+                </a:solidFill>
+                <a:miter lim="800000"/>
+                <a:headEnd/>
+                <a:tailEnd/>
+              </a14:hiddenLine>
+            </a:ext>
+            <a:ext uri="{AF507438-7753-43E0-B8FC-AC1667EBCBE1}">
+              <a14:hiddenEffects xmlns:a14="http://schemas.microsoft.com/office/drawing/2010/main">
+                <a:effectLst>
+                  <a:outerShdw dist="35921" dir="2700000" algn="ctr" rotWithShape="0">
+                    <a:schemeClr val="bg2"/>
+                  </a:outerShdw>
+                </a:effectLst>
+              </a14:hiddenEffects>
+            </a:ext>
+          </a:extLst>
+        </p:spPr>
+      </p:pic>
+    </p:spTree>
+    <p:extLst>
+      <p:ext uri="{BB962C8B-B14F-4D97-AF65-F5344CB8AC3E}">
+        <p14:creationId xmlns:p14="http://schemas.microsoft.com/office/powerpoint/2010/main" val="846100910"/>
+      </p:ext>
+    </p:extLst>
+  </p:cSld>
+  <p:clrMapOvr>
+    <a:masterClrMapping/>
+  </p:clrMapOvr>
+</p:sld>
+</file>
+
+<file path=ppt/slides/slide21.xml><?xml version="1.0" encoding="utf-8"?>
+<p:sld xmlns:a="http://schemas.openxmlformats.org/drawingml/2006/main" xmlns:r="http://schemas.openxmlformats.org/officeDocument/2006/relationships" xmlns:p="http://schemas.openxmlformats.org/presentationml/2006/main">
+  <p:cSld>
+    <p:spTree>
+      <p:nvGrpSpPr>
+        <p:cNvPr id="1" name=""/>
+        <p:cNvGrpSpPr/>
+        <p:nvPr/>
+      </p:nvGrpSpPr>
+      <p:grpSpPr>
+        <a:xfrm>
+          <a:off x="0" y="0"/>
+          <a:ext cx="0" cy="0"/>
+          <a:chOff x="0" y="0"/>
+          <a:chExt cx="0" cy="0"/>
+        </a:xfrm>
+      </p:grpSpPr>
+      <p:sp>
+        <p:nvSpPr>
+          <p:cNvPr id="2" name="Τίτλος 1"/>
+          <p:cNvSpPr>
+            <a:spLocks noGrp="1"/>
+          </p:cNvSpPr>
+          <p:nvPr>
+            <p:ph type="title"/>
+          </p:nvPr>
+        </p:nvSpPr>
+        <p:spPr/>
+        <p:txBody>
+          <a:bodyPr/>
+          <a:lstStyle/>
+          <a:p>
+            <a:r>
+              <a:rPr lang="en-US" dirty="0" smtClean="0"/>
+              <a:t>Case 7 (1 Read 2 Writes)</a:t>
+            </a:r>
+            <a:endParaRPr lang="el-GR" dirty="0"/>
+          </a:p>
+        </p:txBody>
+      </p:sp>
+      <p:pic>
+        <p:nvPicPr>
+          <p:cNvPr id="9218" name="Picture 2"/>
+          <p:cNvPicPr>
+            <a:picLocks noChangeAspect="1" noChangeArrowheads="1"/>
+          </p:cNvPicPr>
+          <p:nvPr/>
+        </p:nvPicPr>
+        <p:blipFill>
+          <a:blip r:embed="rId2">
+            <a:extLst>
+              <a:ext uri="{28A0092B-C50C-407E-A947-70E740481C1C}">
+                <a14:useLocalDpi xmlns:a14="http://schemas.microsoft.com/office/drawing/2010/main" val="0"/>
+              </a:ext>
+            </a:extLst>
+          </a:blip>
+          <a:srcRect/>
+          <a:stretch>
+            <a:fillRect/>
+          </a:stretch>
+        </p:blipFill>
+        <p:spPr bwMode="auto">
+          <a:xfrm>
+            <a:off x="657225" y="1263650"/>
+            <a:ext cx="7829550" cy="4330700"/>
+          </a:xfrm>
+          <a:prstGeom prst="rect">
+            <a:avLst/>
+          </a:prstGeom>
+          <a:noFill/>
+          <a:ln>
+            <a:noFill/>
+          </a:ln>
+          <a:effectLst/>
+          <a:extLst>
+            <a:ext uri="{909E8E84-426E-40DD-AFC4-6F175D3DCCD1}">
+              <a14:hiddenFill xmlns:a14="http://schemas.microsoft.com/office/drawing/2010/main">
+                <a:solidFill>
+                  <a:schemeClr val="accent1"/>
+                </a:solidFill>
+              </a14:hiddenFill>
+            </a:ext>
+            <a:ext uri="{91240B29-F687-4F45-9708-019B960494DF}">
+              <a14:hiddenLine xmlns:a14="http://schemas.microsoft.com/office/drawing/2010/main" w="9525">
+                <a:solidFill>
+                  <a:schemeClr val="tx1"/>
+                </a:solidFill>
+                <a:miter lim="800000"/>
+                <a:headEnd/>
+                <a:tailEnd/>
+              </a14:hiddenLine>
+            </a:ext>
+            <a:ext uri="{AF507438-7753-43E0-B8FC-AC1667EBCBE1}">
+              <a14:hiddenEffects xmlns:a14="http://schemas.microsoft.com/office/drawing/2010/main">
+                <a:effectLst>
+                  <a:outerShdw dist="35921" dir="2700000" algn="ctr" rotWithShape="0">
+                    <a:schemeClr val="bg2"/>
+                  </a:outerShdw>
+                </a:effectLst>
+              </a14:hiddenEffects>
+            </a:ext>
+          </a:extLst>
+        </p:spPr>
+      </p:pic>
+      <p:sp>
+        <p:nvSpPr>
+          <p:cNvPr id="5" name="Θέση περιεχομένου 2"/>
+          <p:cNvSpPr>
+            <a:spLocks noGrp="1"/>
+          </p:cNvSpPr>
+          <p:nvPr>
+            <p:ph idx="1"/>
+          </p:nvPr>
+        </p:nvSpPr>
+        <p:spPr>
+          <a:xfrm>
+            <a:off x="395536" y="5733256"/>
+            <a:ext cx="8748464" cy="1196752"/>
+          </a:xfrm>
+        </p:spPr>
+        <p:txBody>
+          <a:bodyPr>
+            <a:normAutofit fontScale="85000" lnSpcReduction="20000"/>
+          </a:bodyPr>
+          <a:lstStyle/>
+          <a:p>
+            <a:pPr marL="0" indent="0">
+              <a:buNone/>
+            </a:pPr>
+            <a:r>
+              <a:rPr lang="en-US" dirty="0" smtClean="0"/>
+              <a:t>In this case only one Date In causing 2 writes with the first happen in Start State and the second in Extra Write State before return back to Start State</a:t>
+            </a:r>
+            <a:endParaRPr lang="el-GR" dirty="0"/>
+          </a:p>
+        </p:txBody>
+      </p:sp>
+    </p:spTree>
+    <p:extLst>
+      <p:ext uri="{BB962C8B-B14F-4D97-AF65-F5344CB8AC3E}">
+        <p14:creationId xmlns:p14="http://schemas.microsoft.com/office/powerpoint/2010/main" val="3096312609"/>
+      </p:ext>
+    </p:extLst>
+  </p:cSld>
+  <p:clrMapOvr>
+    <a:masterClrMapping/>
+  </p:clrMapOvr>
+</p:sld>
+</file>
+
+<file path=ppt/slides/slide3.xml><?xml version="1.0" encoding="utf-8"?>
+<p:sld xmlns:a="http://schemas.openxmlformats.org/drawingml/2006/main" xmlns:r="http://schemas.openxmlformats.org/officeDocument/2006/relationships" xmlns:p="http://schemas.openxmlformats.org/presentationml/2006/main">
+  <p:cSld>
+    <p:spTree>
+      <p:nvGrpSpPr>
+        <p:cNvPr id="1" name=""/>
+        <p:cNvGrpSpPr/>
+        <p:nvPr/>
+      </p:nvGrpSpPr>
+      <p:grpSpPr>
+        <a:xfrm>
+          <a:off x="0" y="0"/>
+          <a:ext cx="0" cy="0"/>
+          <a:chOff x="0" y="0"/>
+          <a:chExt cx="0" cy="0"/>
+        </a:xfrm>
+      </p:grpSpPr>
+      <p:sp>
+        <p:nvSpPr>
+          <p:cNvPr id="2" name="Τίτλος 1"/>
+          <p:cNvSpPr>
+            <a:spLocks noGrp="1"/>
+          </p:cNvSpPr>
+          <p:nvPr>
+            <p:ph type="title"/>
+          </p:nvPr>
+        </p:nvSpPr>
         <p:spPr>
           <a:xfrm>
             <a:off x="457200" y="116632"/>
@@ -3561,7 +5152,7 @@
       </p:sp>
       <p:pic>
         <p:nvPicPr>
-          <p:cNvPr id="3" name="Picture 2" descr="C:\Users\Aggelos\Downloads\barrelShifter-Σελίδα-1.drawio (3).png"/>
+          <p:cNvPr id="2050" name="Picture 2" descr="C:\Users\Aggelos\Downloads\barrelShifter-BarrelShifter.drawio.png"/>
           <p:cNvPicPr>
             <a:picLocks noChangeAspect="1" noChangeArrowheads="1"/>
           </p:cNvPicPr>
@@ -3575,13 +5166,13 @@
               </a:ext>
             </a:extLst>
           </a:blip>
-          <a:srcRect t="5136"/>
+          <a:srcRect t="5144"/>
           <a:stretch/>
         </p:blipFill>
         <p:spPr bwMode="auto">
           <a:xfrm>
-            <a:off x="0" y="980728"/>
-            <a:ext cx="9144000" cy="5617675"/>
+            <a:off x="0" y="1052736"/>
+            <a:ext cx="9144000" cy="5714899"/>
           </a:xfrm>
           <a:prstGeom prst="rect">
             <a:avLst/>
@@ -3611,7 +5202,7 @@
 </p:sld>
 </file>
 
-<file path=ppt/slides/slide3.xml><?xml version="1.0" encoding="utf-8"?>
+<file path=ppt/slides/slide4.xml><?xml version="1.0" encoding="utf-8"?>
 <p:sld xmlns:a="http://schemas.openxmlformats.org/drawingml/2006/main" xmlns:r="http://schemas.openxmlformats.org/officeDocument/2006/relationships" xmlns:p="http://schemas.openxmlformats.org/presentationml/2006/main">
   <p:cSld>
     <p:spTree>
@@ -3841,7 +5432,7 @@
 </p:sld>
 </file>
 
-<file path=ppt/slides/slide4.xml><?xml version="1.0" encoding="utf-8"?>
+<file path=ppt/slides/slide5.xml><?xml version="1.0" encoding="utf-8"?>
 <p:sld xmlns:a="http://schemas.openxmlformats.org/drawingml/2006/main" xmlns:r="http://schemas.openxmlformats.org/officeDocument/2006/relationships" xmlns:p="http://schemas.openxmlformats.org/presentationml/2006/main">
   <p:cSld>
     <p:spTree>
@@ -3942,7 +5533,7 @@
 </p:sld>
 </file>
 
-<file path=ppt/slides/slide5.xml><?xml version="1.0" encoding="utf-8"?>
+<file path=ppt/slides/slide6.xml><?xml version="1.0" encoding="utf-8"?>
 <p:sld xmlns:a="http://schemas.openxmlformats.org/drawingml/2006/main" xmlns:r="http://schemas.openxmlformats.org/officeDocument/2006/relationships" xmlns:p="http://schemas.openxmlformats.org/presentationml/2006/main">
   <p:cSld>
     <p:spTree>
@@ -3984,7 +5575,7 @@
       </p:sp>
       <p:pic>
         <p:nvPicPr>
-          <p:cNvPr id="3074" name="Picture 2" descr="C:\Users\Aggelos\Downloads\barrelShifter-Αντιγραφή από Σελίδα-2.drawio.png"/>
+          <p:cNvPr id="3" name="Picture 2" descr="C:\Users\Aggelos\Downloads\barrelShifter-FSM BS.drawio.png"/>
           <p:cNvPicPr>
             <a:picLocks noChangeAspect="1" noChangeArrowheads="1"/>
           </p:cNvPicPr>
@@ -3998,13 +5589,13 @@
               </a:ext>
             </a:extLst>
           </a:blip>
-          <a:srcRect t="12730"/>
+          <a:srcRect t="12106"/>
           <a:stretch/>
         </p:blipFill>
         <p:spPr bwMode="auto">
           <a:xfrm>
-            <a:off x="107504" y="1484784"/>
-            <a:ext cx="8928992" cy="5208316"/>
+            <a:off x="0" y="1189973"/>
+            <a:ext cx="9144000" cy="5193373"/>
           </a:xfrm>
           <a:prstGeom prst="rect">
             <a:avLst/>
@@ -4034,7 +5625,7 @@
 </p:sld>
 </file>
 
-<file path=ppt/slides/slide6.xml><?xml version="1.0" encoding="utf-8"?>
+<file path=ppt/slides/slide7.xml><?xml version="1.0" encoding="utf-8"?>
 <p:sld xmlns:a="http://schemas.openxmlformats.org/drawingml/2006/main" xmlns:r="http://schemas.openxmlformats.org/officeDocument/2006/relationships" xmlns:p="http://schemas.openxmlformats.org/presentationml/2006/main">
   <p:cSld>
     <p:spTree>
@@ -4187,7 +5778,7 @@
 </p:sld>
 </file>
 
-<file path=ppt/slides/slide7.xml><?xml version="1.0" encoding="utf-8"?>
+<file path=ppt/slides/slide8.xml><?xml version="1.0" encoding="utf-8"?>
 <p:sld xmlns:a="http://schemas.openxmlformats.org/drawingml/2006/main" xmlns:r="http://schemas.openxmlformats.org/officeDocument/2006/relationships" xmlns:p="http://schemas.openxmlformats.org/presentationml/2006/main">
   <p:cSld>
     <p:spTree>
@@ -4310,7 +5901,7 @@
 </p:sld>
 </file>
 
-<file path=ppt/slides/slide8.xml><?xml version="1.0" encoding="utf-8"?>
+<file path=ppt/slides/slide9.xml><?xml version="1.0" encoding="utf-8"?>
 <p:sld xmlns:a="http://schemas.openxmlformats.org/drawingml/2006/main" xmlns:r="http://schemas.openxmlformats.org/officeDocument/2006/relationships" xmlns:p="http://schemas.openxmlformats.org/presentationml/2006/main">
   <p:cSld>
     <p:spTree>
@@ -4447,148 +6038,6 @@
     <p:extLst>
       <p:ext uri="{BB962C8B-B14F-4D97-AF65-F5344CB8AC3E}">
         <p14:creationId xmlns:p14="http://schemas.microsoft.com/office/powerpoint/2010/main" val="1514581995"/>
-      </p:ext>
-    </p:extLst>
-  </p:cSld>
-  <p:clrMapOvr>
-    <a:masterClrMapping/>
-  </p:clrMapOvr>
-</p:sld>
-</file>
-
-<file path=ppt/slides/slide9.xml><?xml version="1.0" encoding="utf-8"?>
-<p:sld xmlns:a="http://schemas.openxmlformats.org/drawingml/2006/main" xmlns:r="http://schemas.openxmlformats.org/officeDocument/2006/relationships" xmlns:p="http://schemas.openxmlformats.org/presentationml/2006/main">
-  <p:cSld>
-    <p:spTree>
-      <p:nvGrpSpPr>
-        <p:cNvPr id="1" name=""/>
-        <p:cNvGrpSpPr/>
-        <p:nvPr/>
-      </p:nvGrpSpPr>
-      <p:grpSpPr>
-        <a:xfrm>
-          <a:off x="0" y="0"/>
-          <a:ext cx="0" cy="0"/>
-          <a:chOff x="0" y="0"/>
-          <a:chExt cx="0" cy="0"/>
-        </a:xfrm>
-      </p:grpSpPr>
-      <p:sp>
-        <p:nvSpPr>
-          <p:cNvPr id="2" name="Τίτλος 1"/>
-          <p:cNvSpPr>
-            <a:spLocks noGrp="1"/>
-          </p:cNvSpPr>
-          <p:nvPr>
-            <p:ph type="title"/>
-          </p:nvPr>
-        </p:nvSpPr>
-        <p:spPr/>
-        <p:txBody>
-          <a:bodyPr/>
-          <a:lstStyle/>
-          <a:p>
-            <a:r>
-              <a:rPr lang="en-US" dirty="0" smtClean="0"/>
-              <a:t>Case 4</a:t>
-            </a:r>
-            <a:endParaRPr lang="el-GR" dirty="0"/>
-          </a:p>
-        </p:txBody>
-      </p:sp>
-      <p:pic>
-        <p:nvPicPr>
-          <p:cNvPr id="7170" name="Picture 2" descr="C:\Users\Aggelos\Downloads\barrelShifter-Σελίδα-7.drawio (3).png"/>
-          <p:cNvPicPr>
-            <a:picLocks noChangeAspect="1" noChangeArrowheads="1"/>
-          </p:cNvPicPr>
-          <p:nvPr/>
-        </p:nvPicPr>
-        <p:blipFill>
-          <a:blip r:embed="rId2">
-            <a:extLst>
-              <a:ext uri="{28A0092B-C50C-407E-A947-70E740481C1C}">
-                <a14:useLocalDpi xmlns:a14="http://schemas.microsoft.com/office/drawing/2010/main" val="0"/>
-              </a:ext>
-            </a:extLst>
-          </a:blip>
-          <a:srcRect/>
-          <a:stretch>
-            <a:fillRect/>
-          </a:stretch>
-        </p:blipFill>
-        <p:spPr bwMode="auto">
-          <a:xfrm>
-            <a:off x="1331640" y="1324412"/>
-            <a:ext cx="5400600" cy="5400600"/>
-          </a:xfrm>
-          <a:prstGeom prst="rect">
-            <a:avLst/>
-          </a:prstGeom>
-          <a:noFill/>
-          <a:extLst>
-            <a:ext uri="{909E8E84-426E-40DD-AFC4-6F175D3DCCD1}">
-              <a14:hiddenFill xmlns:a14="http://schemas.microsoft.com/office/drawing/2010/main">
-                <a:solidFill>
-                  <a:srgbClr val="FFFFFF"/>
-                </a:solidFill>
-              </a14:hiddenFill>
-            </a:ext>
-          </a:extLst>
-        </p:spPr>
-      </p:pic>
-      <p:sp>
-        <p:nvSpPr>
-          <p:cNvPr id="7" name="Ορθογώνιο 6"/>
-          <p:cNvSpPr/>
-          <p:nvPr/>
-        </p:nvSpPr>
-        <p:spPr>
-          <a:xfrm>
-            <a:off x="539553" y="1916832"/>
-            <a:ext cx="3096344" cy="646331"/>
-          </a:xfrm>
-          <a:prstGeom prst="rect">
-            <a:avLst/>
-          </a:prstGeom>
-        </p:spPr>
-        <p:txBody>
-          <a:bodyPr wrap="square">
-            <a:spAutoFit/>
-          </a:bodyPr>
-          <a:lstStyle/>
-          <a:p>
-            <a:r>
-              <a:rPr lang="en-US" dirty="0"/>
-              <a:t>Shift left </a:t>
-            </a:r>
-            <a:endParaRPr lang="en-US" dirty="0" smtClean="0"/>
-          </a:p>
-          <a:p>
-            <a:r>
-              <a:rPr lang="en-US" dirty="0" err="1" smtClean="0"/>
-              <a:t>NumbOfRead</a:t>
-            </a:r>
-            <a:r>
-              <a:rPr lang="en-US" dirty="0" smtClean="0"/>
-              <a:t> != </a:t>
-            </a:r>
-            <a:r>
-              <a:rPr lang="en-US" dirty="0" err="1"/>
-              <a:t>NumOfWrite</a:t>
-            </a:r>
-            <a:r>
-              <a:rPr lang="en-US" dirty="0"/>
-              <a:t> </a:t>
-            </a:r>
-            <a:endParaRPr lang="el-GR" dirty="0"/>
-          </a:p>
-        </p:txBody>
-      </p:sp>
-    </p:spTree>
-    <p:extLst>
-      <p:ext uri="{BB962C8B-B14F-4D97-AF65-F5344CB8AC3E}">
-        <p14:creationId xmlns:p14="http://schemas.microsoft.com/office/powerpoint/2010/main" val="2626354569"/>
       </p:ext>
     </p:extLst>
   </p:cSld>

</xml_diff>